<commit_message>
making changes to framing template
</commit_message>
<xml_diff>
--- a/FInal_Project_Faming_Maame_KM.pptx
+++ b/FInal_Project_Faming_Maame_KM.pptx
@@ -11,8 +11,7 @@
     <p:sldId id="259" r:id="rId5"/>
     <p:sldId id="262" r:id="rId6"/>
     <p:sldId id="261" r:id="rId7"/>
-    <p:sldId id="263" r:id="rId8"/>
-    <p:sldId id="260" r:id="rId9"/>
+    <p:sldId id="260" r:id="rId8"/>
   </p:sldIdLst>
   <p:sldSz cx="12192000" cy="6858000"/>
   <p:notesSz cx="6858000" cy="9144000"/>
@@ -312,7 +311,7 @@
           <a:p>
             <a:fld id="{5A11CC1C-E4D1-4E15-90A8-C95BF9B87F70}" type="datetimeFigureOut">
               <a:rPr lang="en-US" smtClean="0"/>
-              <a:t>12/11/25</a:t>
+              <a:t>12/18/25</a:t>
             </a:fld>
             <a:endParaRPr lang="en-US"/>
           </a:p>
@@ -547,7 +546,7 @@
           <a:p>
             <a:fld id="{5A11CC1C-E4D1-4E15-90A8-C95BF9B87F70}" type="datetimeFigureOut">
               <a:rPr lang="en-US" smtClean="0"/>
-              <a:t>12/11/25</a:t>
+              <a:t>12/18/25</a:t>
             </a:fld>
             <a:endParaRPr lang="en-US"/>
           </a:p>
@@ -755,7 +754,7 @@
           <a:p>
             <a:fld id="{5A11CC1C-E4D1-4E15-90A8-C95BF9B87F70}" type="datetimeFigureOut">
               <a:rPr lang="en-US" smtClean="0"/>
-              <a:t>12/11/25</a:t>
+              <a:t>12/18/25</a:t>
             </a:fld>
             <a:endParaRPr lang="en-US"/>
           </a:p>
@@ -961,7 +960,7 @@
           <a:p>
             <a:fld id="{5A11CC1C-E4D1-4E15-90A8-C95BF9B87F70}" type="datetimeFigureOut">
               <a:rPr lang="en-US" smtClean="0"/>
-              <a:t>12/11/25</a:t>
+              <a:t>12/18/25</a:t>
             </a:fld>
             <a:endParaRPr lang="en-US"/>
           </a:p>
@@ -1272,7 +1271,7 @@
           <a:p>
             <a:fld id="{5A11CC1C-E4D1-4E15-90A8-C95BF9B87F70}" type="datetimeFigureOut">
               <a:rPr lang="en-US" smtClean="0"/>
-              <a:t>12/11/25</a:t>
+              <a:t>12/18/25</a:t>
             </a:fld>
             <a:endParaRPr lang="en-US"/>
           </a:p>
@@ -1537,7 +1536,7 @@
           <a:p>
             <a:fld id="{5A11CC1C-E4D1-4E15-90A8-C95BF9B87F70}" type="datetimeFigureOut">
               <a:rPr lang="en-US" smtClean="0"/>
-              <a:t>12/11/25</a:t>
+              <a:t>12/18/25</a:t>
             </a:fld>
             <a:endParaRPr lang="en-US"/>
           </a:p>
@@ -1949,7 +1948,7 @@
           <a:p>
             <a:fld id="{5A11CC1C-E4D1-4E15-90A8-C95BF9B87F70}" type="datetimeFigureOut">
               <a:rPr lang="en-US" smtClean="0"/>
-              <a:t>12/11/25</a:t>
+              <a:t>12/18/25</a:t>
             </a:fld>
             <a:endParaRPr lang="en-US"/>
           </a:p>
@@ -2095,7 +2094,7 @@
           <a:p>
             <a:fld id="{5A11CC1C-E4D1-4E15-90A8-C95BF9B87F70}" type="datetimeFigureOut">
               <a:rPr lang="en-US" smtClean="0"/>
-              <a:t>12/11/25</a:t>
+              <a:t>12/18/25</a:t>
             </a:fld>
             <a:endParaRPr lang="en-US"/>
           </a:p>
@@ -2208,7 +2207,7 @@
           <a:p>
             <a:fld id="{5A11CC1C-E4D1-4E15-90A8-C95BF9B87F70}" type="datetimeFigureOut">
               <a:rPr lang="en-US" smtClean="0"/>
-              <a:t>12/11/25</a:t>
+              <a:t>12/18/25</a:t>
             </a:fld>
             <a:endParaRPr lang="en-US"/>
           </a:p>
@@ -2519,7 +2518,7 @@
           <a:p>
             <a:fld id="{5A11CC1C-E4D1-4E15-90A8-C95BF9B87F70}" type="datetimeFigureOut">
               <a:rPr lang="en-US" smtClean="0"/>
-              <a:t>12/11/25</a:t>
+              <a:t>12/18/25</a:t>
             </a:fld>
             <a:endParaRPr lang="en-US"/>
           </a:p>
@@ -2810,7 +2809,7 @@
           <a:p>
             <a:fld id="{5A11CC1C-E4D1-4E15-90A8-C95BF9B87F70}" type="datetimeFigureOut">
               <a:rPr lang="en-US" smtClean="0"/>
-              <a:t>12/11/25</a:t>
+              <a:t>12/18/25</a:t>
             </a:fld>
             <a:endParaRPr lang="en-US"/>
           </a:p>
@@ -3051,7 +3050,7 @@
           <a:p>
             <a:fld id="{5A11CC1C-E4D1-4E15-90A8-C95BF9B87F70}" type="datetimeFigureOut">
               <a:rPr lang="en-US" smtClean="0"/>
-              <a:t>12/11/25</a:t>
+              <a:t>12/18/25</a:t>
             </a:fld>
             <a:endParaRPr lang="en-US"/>
           </a:p>
@@ -3627,7 +3626,7 @@
           <a:p>
             <a:r>
               <a:rPr lang="en-US" sz="3600" dirty="0"/>
-              <a:t>Maame Afua is building ConsultEASE – a website that helps small business businesses find and work with business consultants in our company without needing personal connections. </a:t>
+              <a:t>Maame Afua is building ConsultEASE – a website that helps individuals interact with business consultants in our company without needing personal connections. </a:t>
             </a:r>
             <a:br>
               <a:rPr lang="en-US" sz="3600" dirty="0"/>
@@ -3744,7 +3743,7 @@
         </p:nvSpPr>
         <p:spPr>
           <a:xfrm>
-            <a:off x="5386300" y="4233075"/>
+            <a:off x="5414488" y="4297575"/>
             <a:ext cx="3378900" cy="1561500"/>
           </a:xfrm>
           <a:prstGeom prst="rect">
@@ -3784,31 +3783,7 @@
                 <a:cs typeface="Calibri"/>
                 <a:sym typeface="Calibri"/>
               </a:rPr>
-              <a:t>PAYOFF: </a:t>
-            </a:r>
-            <a:r>
-              <a:rPr lang="en-US" sz="1200" i="1" dirty="0">
-                <a:solidFill>
-                  <a:schemeClr val="dk1"/>
-                </a:solidFill>
-                <a:latin typeface="Calibri"/>
-                <a:ea typeface="Calibri"/>
-                <a:cs typeface="Calibri"/>
-                <a:sym typeface="Calibri"/>
-              </a:rPr>
-              <a:t>What is a simple drawn screen that is illustrative of something the website shows that helps solve the problem.  It is likely a report or some results of data entered by the participants.  </a:t>
-            </a:r>
-            <a:r>
-              <a:rPr lang="en-US" sz="1200" b="1" i="1" dirty="0">
-                <a:solidFill>
-                  <a:schemeClr val="dk1"/>
-                </a:solidFill>
-                <a:latin typeface="Calibri"/>
-                <a:ea typeface="Calibri"/>
-                <a:cs typeface="Calibri"/>
-                <a:sym typeface="Calibri"/>
-              </a:rPr>
-              <a:t>This is the most important square</a:t>
+              <a:t>Draw screen showing client’s dashboard that has an easy interface to see the different consultants you can book, and a card that allows you to quickly see all your appointments. There is also a nav bar that allows clients to access more features like the messaging tabs etc.</a:t>
             </a:r>
             <a:endParaRPr sz="1200" dirty="0">
               <a:solidFill>
@@ -4068,7 +4043,7 @@
                 <a:cs typeface="Calibri"/>
                 <a:sym typeface="Calibri"/>
               </a:rPr>
-              <a:t>Project Title</a:t>
+              <a:t>ConsultEase</a:t>
             </a:r>
           </a:p>
         </p:txBody>
@@ -4339,8 +4314,8 @@
         </p:nvSpPr>
         <p:spPr>
           <a:xfrm>
-            <a:off x="690550" y="4373101"/>
-            <a:ext cx="2143800" cy="1259100"/>
+            <a:off x="659381" y="2107556"/>
+            <a:ext cx="2294863" cy="1259100"/>
           </a:xfrm>
           <a:prstGeom prst="rect">
             <a:avLst/>
@@ -4356,17 +4331,18 @@
           </a:bodyPr>
           <a:lstStyle/>
           <a:p>
-            <a:pPr marL="0" marR="0" lvl="0" indent="0" algn="l" rtl="0">
+            <a:pPr marL="171450" marR="0" lvl="0" indent="-171450" algn="l" rtl="0">
               <a:spcBef>
                 <a:spcPts val="0"/>
               </a:spcBef>
               <a:spcAft>
                 <a:spcPts val="0"/>
               </a:spcAft>
-              <a:buNone/>
+              <a:buFont typeface="Arial" panose="020B0604020202020204" pitchFamily="34" charset="0"/>
+              <a:buChar char="•"/>
             </a:pPr>
             <a:r>
-              <a:rPr lang="en-US" sz="1200" b="0" i="0" u="none" strike="noStrike" cap="none" dirty="0">
+              <a:rPr lang="en-GB" sz="900" i="1" dirty="0">
                 <a:solidFill>
                   <a:schemeClr val="dk1"/>
                 </a:solidFill>
@@ -4375,10 +4351,22 @@
                 <a:cs typeface="Calibri"/>
                 <a:sym typeface="Calibri"/>
               </a:rPr>
-              <a:t>PERSONA</a:t>
-            </a:r>
-            <a:r>
-              <a:rPr lang="en-US" sz="1200" dirty="0">
+              <a:t>Clients: Individuals or businesses seeking professional consulting services. </a:t>
+            </a:r>
+          </a:p>
+          <a:p>
+            <a:pPr marL="171450" marR="0" lvl="0" indent="-171450" algn="l" rtl="0">
+              <a:spcBef>
+                <a:spcPts val="0"/>
+              </a:spcBef>
+              <a:spcAft>
+                <a:spcPts val="0"/>
+              </a:spcAft>
+              <a:buFont typeface="Arial" panose="020B0604020202020204" pitchFamily="34" charset="0"/>
+              <a:buChar char="•"/>
+            </a:pPr>
+            <a:r>
+              <a:rPr lang="en-GB" sz="900" i="1" dirty="0">
                 <a:solidFill>
                   <a:schemeClr val="dk1"/>
                 </a:solidFill>
@@ -4387,10 +4375,22 @@
                 <a:cs typeface="Calibri"/>
                 <a:sym typeface="Calibri"/>
               </a:rPr>
-              <a:t>(s) </a:t>
-            </a:r>
-            <a:r>
-              <a:rPr lang="en-US" sz="1200" i="1" dirty="0">
+              <a:t>Consultants: Certified professionals offering consulting services in various fields. They need to manage their availability, appointments, and client communications efficiently.</a:t>
+            </a:r>
+          </a:p>
+          <a:p>
+            <a:pPr marL="171450" marR="0" lvl="0" indent="-171450" algn="l" rtl="0">
+              <a:spcBef>
+                <a:spcPts val="0"/>
+              </a:spcBef>
+              <a:spcAft>
+                <a:spcPts val="0"/>
+              </a:spcAft>
+              <a:buFont typeface="Arial" panose="020B0604020202020204" pitchFamily="34" charset="0"/>
+              <a:buChar char="•"/>
+            </a:pPr>
+            <a:r>
+              <a:rPr lang="en-GB" sz="900" i="1" dirty="0">
                 <a:solidFill>
                   <a:schemeClr val="dk1"/>
                 </a:solidFill>
@@ -4399,9 +4399,9 @@
                 <a:cs typeface="Calibri"/>
                 <a:sym typeface="Calibri"/>
               </a:rPr>
-              <a:t>who are the people involved in using the website and what are their background</a:t>
-            </a:r>
-            <a:endParaRPr sz="1200" i="1" dirty="0">
+              <a:t>Administrators: Platform managers who oversee system operations, user management, and ensure smooth functioning of the platform.</a:t>
+            </a:r>
+            <a:endParaRPr sz="900" i="1" dirty="0">
               <a:solidFill>
                 <a:schemeClr val="dk1"/>
               </a:solidFill>
@@ -4427,8 +4427,8 @@
         </p:nvSpPr>
         <p:spPr>
           <a:xfrm>
-            <a:off x="3015075" y="4297675"/>
-            <a:ext cx="2144100" cy="1669200"/>
+            <a:off x="3117573" y="1931531"/>
+            <a:ext cx="1982403" cy="1669200"/>
           </a:xfrm>
           <a:prstGeom prst="rect">
             <a:avLst/>
@@ -4453,8 +4453,49 @@
               </a:spcAft>
               <a:buNone/>
             </a:pPr>
-            <a:r>
-              <a:rPr lang="en-US" sz="1200" dirty="0" err="1">
+            <a:endParaRPr lang="en-GB" sz="800" dirty="0">
+              <a:solidFill>
+                <a:schemeClr val="dk1"/>
+              </a:solidFill>
+              <a:latin typeface="Calibri"/>
+              <a:ea typeface="Calibri"/>
+              <a:cs typeface="Calibri"/>
+              <a:sym typeface="Calibri"/>
+            </a:endParaRPr>
+          </a:p>
+          <a:p>
+            <a:pPr marL="0" marR="0" lvl="0" indent="0" algn="l" rtl="0">
+              <a:spcBef>
+                <a:spcPts val="0"/>
+              </a:spcBef>
+              <a:spcAft>
+                <a:spcPts val="0"/>
+              </a:spcAft>
+              <a:buNone/>
+            </a:pPr>
+            <a:endParaRPr lang="en-GB" sz="800" dirty="0">
+              <a:solidFill>
+                <a:schemeClr val="dk1"/>
+              </a:solidFill>
+              <a:latin typeface="Calibri"/>
+              <a:ea typeface="Calibri"/>
+              <a:cs typeface="Calibri"/>
+              <a:sym typeface="Calibri"/>
+            </a:endParaRPr>
+          </a:p>
+          <a:p>
+            <a:pPr marL="171450" marR="0" lvl="0" indent="-171450" algn="l" rtl="0">
+              <a:spcBef>
+                <a:spcPts val="0"/>
+              </a:spcBef>
+              <a:spcAft>
+                <a:spcPts val="0"/>
+              </a:spcAft>
+              <a:buFont typeface="Arial" panose="020B0604020202020204" pitchFamily="34" charset="0"/>
+              <a:buChar char="•"/>
+            </a:pPr>
+            <a:r>
+              <a:rPr lang="en-GB" sz="800" dirty="0">
                 <a:solidFill>
                   <a:schemeClr val="dk1"/>
                 </a:solidFill>
@@ -4463,10 +4504,22 @@
                 <a:cs typeface="Calibri"/>
                 <a:sym typeface="Calibri"/>
               </a:rPr>
-              <a:t>PROBLEM:</a:t>
-            </a:r>
-            <a:r>
-              <a:rPr lang="en-US" sz="1200" i="1" dirty="0" err="1">
+              <a:t>Difficulty accessing consulting advice in an organized manner</a:t>
+            </a:r>
+          </a:p>
+          <a:p>
+            <a:pPr marL="171450" marR="0" lvl="0" indent="-171450" algn="l" rtl="0">
+              <a:spcBef>
+                <a:spcPts val="0"/>
+              </a:spcBef>
+              <a:spcAft>
+                <a:spcPts val="0"/>
+              </a:spcAft>
+              <a:buFont typeface="Arial" panose="020B0604020202020204" pitchFamily="34" charset="0"/>
+              <a:buChar char="•"/>
+            </a:pPr>
+            <a:r>
+              <a:rPr lang="en-GB" sz="800" dirty="0">
                 <a:solidFill>
                   <a:schemeClr val="dk1"/>
                 </a:solidFill>
@@ -4475,10 +4528,22 @@
                 <a:cs typeface="Calibri"/>
                 <a:sym typeface="Calibri"/>
               </a:rPr>
-              <a:t>What</a:t>
-            </a:r>
-            <a:r>
-              <a:rPr lang="en-US" sz="1200" i="1" dirty="0">
+              <a:t>Confusion around consultant availability</a:t>
+            </a:r>
+          </a:p>
+          <a:p>
+            <a:pPr marL="171450" marR="0" lvl="0" indent="-171450" algn="l" rtl="0">
+              <a:spcBef>
+                <a:spcPts val="0"/>
+              </a:spcBef>
+              <a:spcAft>
+                <a:spcPts val="0"/>
+              </a:spcAft>
+              <a:buFont typeface="Arial" panose="020B0604020202020204" pitchFamily="34" charset="0"/>
+              <a:buChar char="•"/>
+            </a:pPr>
+            <a:r>
+              <a:rPr lang="en-GB" sz="800" dirty="0">
                 <a:solidFill>
                   <a:schemeClr val="dk1"/>
                 </a:solidFill>
@@ -4487,9 +4552,81 @@
                 <a:cs typeface="Calibri"/>
                 <a:sym typeface="Calibri"/>
               </a:rPr>
-              <a:t> is the problem the website will solve</a:t>
-            </a:r>
-            <a:endParaRPr sz="1200" dirty="0">
+              <a:t>Poor workload management for consultants</a:t>
+            </a:r>
+          </a:p>
+          <a:p>
+            <a:pPr marL="171450" marR="0" lvl="0" indent="-171450" algn="l" rtl="0">
+              <a:spcBef>
+                <a:spcPts val="0"/>
+              </a:spcBef>
+              <a:spcAft>
+                <a:spcPts val="0"/>
+              </a:spcAft>
+              <a:buFont typeface="Arial" panose="020B0604020202020204" pitchFamily="34" charset="0"/>
+              <a:buChar char="•"/>
+            </a:pPr>
+            <a:r>
+              <a:rPr lang="en-GB" sz="800" dirty="0">
+                <a:solidFill>
+                  <a:schemeClr val="dk1"/>
+                </a:solidFill>
+                <a:latin typeface="Calibri"/>
+                <a:ea typeface="Calibri"/>
+                <a:cs typeface="Calibri"/>
+                <a:sym typeface="Calibri"/>
+              </a:rPr>
+              <a:t>Lack of digital trail for tracking problems and feedback</a:t>
+            </a:r>
+          </a:p>
+          <a:p>
+            <a:pPr marL="171450" marR="0" lvl="0" indent="-171450" algn="l" rtl="0">
+              <a:spcBef>
+                <a:spcPts val="0"/>
+              </a:spcBef>
+              <a:spcAft>
+                <a:spcPts val="0"/>
+              </a:spcAft>
+              <a:buFont typeface="Arial" panose="020B0604020202020204" pitchFamily="34" charset="0"/>
+              <a:buChar char="•"/>
+            </a:pPr>
+            <a:r>
+              <a:rPr lang="en-GB" sz="800" dirty="0">
+                <a:solidFill>
+                  <a:schemeClr val="dk1"/>
+                </a:solidFill>
+                <a:latin typeface="Calibri"/>
+                <a:ea typeface="Calibri"/>
+                <a:cs typeface="Calibri"/>
+                <a:sym typeface="Calibri"/>
+              </a:rPr>
+              <a:t>Limited accessibility for people without time or resources to find consultants traditionally</a:t>
+            </a:r>
+          </a:p>
+          <a:p>
+            <a:pPr marL="171450" marR="0" lvl="0" indent="-171450" algn="l" rtl="0">
+              <a:spcBef>
+                <a:spcPts val="0"/>
+              </a:spcBef>
+              <a:spcAft>
+                <a:spcPts val="0"/>
+              </a:spcAft>
+              <a:buFont typeface="Arial" panose="020B0604020202020204" pitchFamily="34" charset="0"/>
+              <a:buChar char="•"/>
+            </a:pPr>
+            <a:r>
+              <a:rPr lang="en-GB" sz="800" dirty="0">
+                <a:solidFill>
+                  <a:schemeClr val="dk1"/>
+                </a:solidFill>
+                <a:latin typeface="Calibri"/>
+                <a:ea typeface="Calibri"/>
+                <a:cs typeface="Calibri"/>
+                <a:sym typeface="Calibri"/>
+              </a:rPr>
+              <a:t>Scattered communication across multiple platforms (emails, WhatsApp, etc.)</a:t>
+            </a:r>
+            <a:endParaRPr sz="800" dirty="0">
               <a:solidFill>
                 <a:schemeClr val="dk1"/>
               </a:solidFill>
@@ -4515,8 +4652,8 @@
         </p:nvSpPr>
         <p:spPr>
           <a:xfrm>
-            <a:off x="8875975" y="4530330"/>
-            <a:ext cx="2143800" cy="1259100"/>
+            <a:off x="8909785" y="1441735"/>
+            <a:ext cx="2364375" cy="1259100"/>
           </a:xfrm>
           <a:prstGeom prst="rect">
             <a:avLst/>
@@ -4541,8 +4678,49 @@
               </a:spcAft>
               <a:buNone/>
             </a:pPr>
-            <a:r>
-              <a:rPr lang="en-US" sz="1200" dirty="0">
+            <a:endParaRPr lang="en-GB" sz="1200" i="1" dirty="0">
+              <a:solidFill>
+                <a:schemeClr val="dk1"/>
+              </a:solidFill>
+              <a:latin typeface="Calibri"/>
+              <a:ea typeface="Calibri"/>
+              <a:cs typeface="Calibri"/>
+              <a:sym typeface="Calibri"/>
+            </a:endParaRPr>
+          </a:p>
+          <a:p>
+            <a:pPr marL="0" marR="0" lvl="0" indent="0" algn="l" rtl="0">
+              <a:spcBef>
+                <a:spcPts val="0"/>
+              </a:spcBef>
+              <a:spcAft>
+                <a:spcPts val="0"/>
+              </a:spcAft>
+              <a:buNone/>
+            </a:pPr>
+            <a:endParaRPr lang="en-GB" sz="1200" i="1" dirty="0">
+              <a:solidFill>
+                <a:schemeClr val="dk1"/>
+              </a:solidFill>
+              <a:latin typeface="Calibri"/>
+              <a:ea typeface="Calibri"/>
+              <a:cs typeface="Calibri"/>
+              <a:sym typeface="Calibri"/>
+            </a:endParaRPr>
+          </a:p>
+          <a:p>
+            <a:pPr marL="171450" marR="0" lvl="0" indent="-171450" algn="l" rtl="0">
+              <a:spcBef>
+                <a:spcPts val="0"/>
+              </a:spcBef>
+              <a:spcAft>
+                <a:spcPts val="0"/>
+              </a:spcAft>
+              <a:buFont typeface="Arial" panose="020B0604020202020204" pitchFamily="34" charset="0"/>
+              <a:buChar char="•"/>
+            </a:pPr>
+            <a:r>
+              <a:rPr lang="en-GB" sz="800" i="1" dirty="0">
                 <a:solidFill>
                   <a:schemeClr val="dk1"/>
                 </a:solidFill>
@@ -4551,10 +4729,22 @@
                 <a:cs typeface="Calibri"/>
                 <a:sym typeface="Calibri"/>
               </a:rPr>
-              <a:t>FINISH</a:t>
-            </a:r>
-            <a:r>
-              <a:rPr lang="en-US" sz="1200" i="1" dirty="0">
+              <a:t>Clients: Can easily find and book consultants 24/7, communicate directly through the platform, track appointment history, and provide/receive feedback—all in one organized place.</a:t>
+            </a:r>
+          </a:p>
+          <a:p>
+            <a:pPr marL="171450" marR="0" lvl="0" indent="-171450" algn="l" rtl="0">
+              <a:spcBef>
+                <a:spcPts val="0"/>
+              </a:spcBef>
+              <a:spcAft>
+                <a:spcPts val="0"/>
+              </a:spcAft>
+              <a:buFont typeface="Arial" panose="020B0604020202020204" pitchFamily="34" charset="0"/>
+              <a:buChar char="•"/>
+            </a:pPr>
+            <a:r>
+              <a:rPr lang="en-GB" sz="800" i="1" dirty="0">
                 <a:solidFill>
                   <a:schemeClr val="dk1"/>
                 </a:solidFill>
@@ -4563,9 +4753,56 @@
                 <a:cs typeface="Calibri"/>
                 <a:sym typeface="Calibri"/>
               </a:rPr>
-              <a:t>: Why are the users better off with the website than before.</a:t>
-            </a:r>
-            <a:endParaRPr sz="1200" i="1" dirty="0">
+              <a:t>Consultants: Better manage their availability and workload, reduce back-and-forth communication, maintain professional records of sessions, and access minimal analytics about their bookings.</a:t>
+            </a:r>
+          </a:p>
+          <a:p>
+            <a:pPr marL="171450" marR="0" lvl="0" indent="-171450" algn="l" rtl="0">
+              <a:spcBef>
+                <a:spcPts val="0"/>
+              </a:spcBef>
+              <a:spcAft>
+                <a:spcPts val="0"/>
+              </a:spcAft>
+              <a:buFont typeface="Arial" panose="020B0604020202020204" pitchFamily="34" charset="0"/>
+              <a:buChar char="•"/>
+            </a:pPr>
+            <a:r>
+              <a:rPr lang="en-GB" sz="800" i="1" dirty="0">
+                <a:solidFill>
+                  <a:schemeClr val="dk1"/>
+                </a:solidFill>
+                <a:latin typeface="Calibri"/>
+                <a:ea typeface="Calibri"/>
+                <a:cs typeface="Calibri"/>
+                <a:sym typeface="Calibri"/>
+              </a:rPr>
+              <a:t>Administrators: Have full oversight of platform operations, can ensure quality control, and access system-wide data for better decision-making.</a:t>
+            </a:r>
+          </a:p>
+          <a:p>
+            <a:pPr marL="0" marR="0" lvl="0" indent="0" algn="l" rtl="0">
+              <a:spcBef>
+                <a:spcPts val="0"/>
+              </a:spcBef>
+              <a:spcAft>
+                <a:spcPts val="0"/>
+              </a:spcAft>
+              <a:buNone/>
+            </a:pPr>
+            <a:r>
+              <a:rPr lang="en-GB" sz="800" i="1" dirty="0">
+                <a:solidFill>
+                  <a:schemeClr val="dk1"/>
+                </a:solidFill>
+                <a:latin typeface="Calibri"/>
+                <a:ea typeface="Calibri"/>
+                <a:cs typeface="Calibri"/>
+                <a:sym typeface="Calibri"/>
+              </a:rPr>
+              <a:t>Overall: The platform creates efficiency, transparency, and accessibility that didn't exist before.</a:t>
+            </a:r>
+            <a:endParaRPr sz="800" i="1" dirty="0">
               <a:solidFill>
                 <a:schemeClr val="dk1"/>
               </a:solidFill>
@@ -4577,39 +4814,147 @@
           </a:p>
         </p:txBody>
       </p:sp>
-      <p:pic>
-        <p:nvPicPr>
-          <p:cNvPr id="37" name="Google Shape;139;p26">
-            <a:extLst>
-              <a:ext uri="{FF2B5EF4-FFF2-40B4-BE49-F238E27FC236}">
-                <a16:creationId xmlns:a16="http://schemas.microsoft.com/office/drawing/2014/main" id="{B9D37766-E66F-4991-B723-26BE9C9BC1A3}"/>
-              </a:ext>
-            </a:extLst>
-          </p:cNvPr>
-          <p:cNvPicPr preferRelativeResize="0"/>
+      <p:sp>
+        <p:nvSpPr>
+          <p:cNvPr id="3" name="TextBox 2">
+            <a:extLst>
+              <a:ext uri="{FF2B5EF4-FFF2-40B4-BE49-F238E27FC236}">
+                <a16:creationId xmlns:a16="http://schemas.microsoft.com/office/drawing/2014/main" id="{CFBBCF16-DFD5-C75C-CCE0-BBDE450A12FA}"/>
+              </a:ext>
+            </a:extLst>
+          </p:cNvPr>
+          <p:cNvSpPr txBox="1"/>
           <p:nvPr/>
-        </p:nvPicPr>
-        <p:blipFill rotWithShape="1">
-          <a:blip r:embed="rId2">
-            <a:alphaModFix/>
-          </a:blip>
-          <a:srcRect l="20430" t="5231" r="20211" b="22706"/>
-          <a:stretch/>
-        </p:blipFill>
+        </p:nvSpPr>
         <p:spPr>
           <a:xfrm>
-            <a:off x="6160925" y="972725"/>
-            <a:ext cx="1846575" cy="2988902"/>
+            <a:off x="1134616" y="4762843"/>
+            <a:ext cx="6224954" cy="369332"/>
           </a:xfrm>
           <a:prstGeom prst="rect">
             <a:avLst/>
           </a:prstGeom>
           <a:noFill/>
-          <a:ln>
-            <a:noFill/>
-          </a:ln>
+        </p:spPr>
+        <p:txBody>
+          <a:bodyPr wrap="square">
+            <a:spAutoFit/>
+          </a:bodyPr>
+          <a:lstStyle/>
+          <a:p>
+            <a:r>
+              <a:rPr lang="en-GH" dirty="0"/>
+              <a:t>USERS</a:t>
+            </a:r>
+          </a:p>
+        </p:txBody>
+      </p:sp>
+      <p:sp>
+        <p:nvSpPr>
+          <p:cNvPr id="6" name="TextBox 5">
+            <a:extLst>
+              <a:ext uri="{FF2B5EF4-FFF2-40B4-BE49-F238E27FC236}">
+                <a16:creationId xmlns:a16="http://schemas.microsoft.com/office/drawing/2014/main" id="{4E791D75-EAF9-0A36-1206-D6EA46C5957A}"/>
+              </a:ext>
+            </a:extLst>
+          </p:cNvPr>
+          <p:cNvSpPr txBox="1"/>
+          <p:nvPr/>
+        </p:nvSpPr>
+        <p:spPr>
+          <a:xfrm>
+            <a:off x="3313128" y="4690659"/>
+            <a:ext cx="1867929" cy="646331"/>
+          </a:xfrm>
+          <a:prstGeom prst="rect">
+            <a:avLst/>
+          </a:prstGeom>
+          <a:noFill/>
+        </p:spPr>
+        <p:txBody>
+          <a:bodyPr wrap="square">
+            <a:spAutoFit/>
+          </a:bodyPr>
+          <a:lstStyle/>
+          <a:p>
+            <a:r>
+              <a:rPr lang="en-GH" dirty="0"/>
+              <a:t>PROBLEM SOLVED</a:t>
+            </a:r>
+          </a:p>
+        </p:txBody>
+      </p:sp>
+      <p:pic>
+        <p:nvPicPr>
+          <p:cNvPr id="10" name="Picture 9" descr="A graph paper with writing on it&#10;&#10;AI-generated content may be incorrect.">
+            <a:extLst>
+              <a:ext uri="{FF2B5EF4-FFF2-40B4-BE49-F238E27FC236}">
+                <a16:creationId xmlns:a16="http://schemas.microsoft.com/office/drawing/2014/main" id="{20EEEBE1-D6B3-CD1A-D537-D688A2E36A9A}"/>
+              </a:ext>
+            </a:extLst>
+          </p:cNvPr>
+          <p:cNvPicPr>
+            <a:picLocks noChangeAspect="1"/>
+          </p:cNvPicPr>
+          <p:nvPr/>
+        </p:nvPicPr>
+        <p:blipFill>
+          <a:blip r:embed="rId2">
+            <a:extLst>
+              <a:ext uri="{28A0092B-C50C-407E-A947-70E740481C1C}">
+                <a14:useLocalDpi xmlns:a14="http://schemas.microsoft.com/office/drawing/2010/main" val="0"/>
+              </a:ext>
+            </a:extLst>
+          </a:blip>
+          <a:stretch>
+            <a:fillRect/>
+          </a:stretch>
+        </p:blipFill>
+        <p:spPr>
+          <a:xfrm>
+            <a:off x="5446570" y="1028630"/>
+            <a:ext cx="3171165" cy="2874115"/>
+          </a:xfrm>
+          <a:prstGeom prst="rect">
+            <a:avLst/>
+          </a:prstGeom>
         </p:spPr>
       </p:pic>
+      <p:sp>
+        <p:nvSpPr>
+          <p:cNvPr id="14" name="TextBox 13">
+            <a:extLst>
+              <a:ext uri="{FF2B5EF4-FFF2-40B4-BE49-F238E27FC236}">
+                <a16:creationId xmlns:a16="http://schemas.microsoft.com/office/drawing/2014/main" id="{DEA7C5EB-E1A6-F17B-CB7A-BBF3EFD8A3C8}"/>
+              </a:ext>
+            </a:extLst>
+          </p:cNvPr>
+          <p:cNvSpPr txBox="1"/>
+          <p:nvPr/>
+        </p:nvSpPr>
+        <p:spPr>
+          <a:xfrm>
+            <a:off x="9140247" y="4755159"/>
+            <a:ext cx="1982403" cy="646331"/>
+          </a:xfrm>
+          <a:prstGeom prst="rect">
+            <a:avLst/>
+          </a:prstGeom>
+          <a:noFill/>
+        </p:spPr>
+        <p:txBody>
+          <a:bodyPr wrap="square">
+            <a:spAutoFit/>
+          </a:bodyPr>
+          <a:lstStyle/>
+          <a:p>
+            <a:r>
+              <a:rPr lang="en-GH" dirty="0"/>
+              <a:t>WHY USERS ARE BETTER OFF</a:t>
+            </a:r>
+          </a:p>
+        </p:txBody>
+      </p:sp>
     </p:spTree>
     <p:extLst>
       <p:ext uri="{BB962C8B-B14F-4D97-AF65-F5344CB8AC3E}">
@@ -4713,7 +5058,24 @@
                 <a:ea typeface="Calibri" panose="020F0502020204030204" pitchFamily="34" charset="0"/>
                 <a:cs typeface="Arial" panose="020B0604020202020204" pitchFamily="34" charset="0"/>
               </a:rPr>
-              <a:t>This is a consultancy matchmaking service that connects Ghanaian startups with business consultants. Its purpose is to democratize access to professional business advice by removing networking barriers through technology.</a:t>
+              <a:t>This is a consultancy matchmaking service that connects Ghanaian business </a:t>
+            </a:r>
+            <a:r>
+              <a:rPr lang="en-US" sz="1800" dirty="0">
+                <a:latin typeface="Calibri" panose="020F0502020204030204" pitchFamily="34" charset="0"/>
+                <a:ea typeface="Calibri" panose="020F0502020204030204" pitchFamily="34" charset="0"/>
+                <a:cs typeface="Arial" panose="020B0604020202020204" pitchFamily="34" charset="0"/>
+              </a:rPr>
+              <a:t>owners </a:t>
+            </a:r>
+            <a:r>
+              <a:rPr lang="en-US" sz="1800" dirty="0">
+                <a:effectLst/>
+                <a:latin typeface="Calibri" panose="020F0502020204030204" pitchFamily="34" charset="0"/>
+                <a:ea typeface="Calibri" panose="020F0502020204030204" pitchFamily="34" charset="0"/>
+                <a:cs typeface="Arial" panose="020B0604020202020204" pitchFamily="34" charset="0"/>
+              </a:rPr>
+              <a:t>with business consultants in my consulting firm. Its purpose is to democratize access to professional business advice by removing networking barriers through technology.</a:t>
             </a:r>
           </a:p>
           <a:p>
@@ -5433,7 +5795,7 @@
             </a:pPr>
             <a:r>
               <a:rPr lang="en-US" sz="2400" dirty="0"/>
-              <a:t>1. CONSULTANT DISCOVERY SYSTEM : Browse verified experts by expertise without personal connections</a:t>
+              <a:t>1. CONSULTANT DISCOVERY SYSTEM : Browse verified experts without personal connections</a:t>
             </a:r>
           </a:p>
           <a:p>
@@ -5495,142 +5857,6 @@
   <p:cSld>
     <p:spTree>
       <p:nvGrpSpPr>
-        <p:cNvPr id="1" name="">
-          <a:extLst>
-            <a:ext uri="{FF2B5EF4-FFF2-40B4-BE49-F238E27FC236}">
-              <a16:creationId xmlns:a16="http://schemas.microsoft.com/office/drawing/2014/main" id="{120C0D00-C63A-523F-C1B5-A7FFF7AB9A97}"/>
-            </a:ext>
-          </a:extLst>
-        </p:cNvPr>
-        <p:cNvGrpSpPr/>
-        <p:nvPr/>
-      </p:nvGrpSpPr>
-      <p:grpSpPr>
-        <a:xfrm>
-          <a:off x="0" y="0"/>
-          <a:ext cx="0" cy="0"/>
-          <a:chOff x="0" y="0"/>
-          <a:chExt cx="0" cy="0"/>
-        </a:xfrm>
-      </p:grpSpPr>
-      <p:sp>
-        <p:nvSpPr>
-          <p:cNvPr id="2" name="Title 1">
-            <a:extLst>
-              <a:ext uri="{FF2B5EF4-FFF2-40B4-BE49-F238E27FC236}">
-                <a16:creationId xmlns:a16="http://schemas.microsoft.com/office/drawing/2014/main" id="{8F9057B6-85EC-AB58-1D89-F966FDB8B867}"/>
-              </a:ext>
-            </a:extLst>
-          </p:cNvPr>
-          <p:cNvSpPr>
-            <a:spLocks noGrp="1"/>
-          </p:cNvSpPr>
-          <p:nvPr>
-            <p:ph type="title"/>
-          </p:nvPr>
-        </p:nvSpPr>
-        <p:spPr/>
-        <p:txBody>
-          <a:bodyPr/>
-          <a:lstStyle/>
-          <a:p>
-            <a:r>
-              <a:rPr lang="en-US" dirty="0"/>
-              <a:t>Main Functions of the Website</a:t>
-            </a:r>
-          </a:p>
-        </p:txBody>
-      </p:sp>
-      <p:sp>
-        <p:nvSpPr>
-          <p:cNvPr id="3" name="Content Placeholder 2">
-            <a:extLst>
-              <a:ext uri="{FF2B5EF4-FFF2-40B4-BE49-F238E27FC236}">
-                <a16:creationId xmlns:a16="http://schemas.microsoft.com/office/drawing/2014/main" id="{2F788688-3510-BE55-B3CA-64B17286C2E0}"/>
-              </a:ext>
-            </a:extLst>
-          </p:cNvPr>
-          <p:cNvSpPr>
-            <a:spLocks noGrp="1"/>
-          </p:cNvSpPr>
-          <p:nvPr>
-            <p:ph idx="1"/>
-          </p:nvPr>
-        </p:nvSpPr>
-        <p:spPr/>
-        <p:txBody>
-          <a:bodyPr>
-            <a:normAutofit lnSpcReduction="10000"/>
-          </a:bodyPr>
-          <a:lstStyle/>
-          <a:p>
-            <a:pPr marL="0" indent="0">
-              <a:buNone/>
-            </a:pPr>
-            <a:r>
-              <a:rPr lang="en-US" sz="2400" dirty="0"/>
-              <a:t>1. CONSULTANT DISCOVERY SYSTEM : Browse verified experts by expertise without personal connections</a:t>
-            </a:r>
-          </a:p>
-          <a:p>
-            <a:endParaRPr lang="en-US" sz="2400" dirty="0"/>
-          </a:p>
-          <a:p>
-            <a:pPr marL="0" indent="0">
-              <a:buNone/>
-            </a:pPr>
-            <a:r>
-              <a:rPr lang="en-US" sz="2400" dirty="0"/>
-              <a:t>2. TRANSPARENT AVAILABILITY CALENDAR: Book real time slots with a live calendar, preventing past date and time bookings (GMT)</a:t>
-            </a:r>
-          </a:p>
-          <a:p>
-            <a:endParaRPr lang="en-US" sz="2400" dirty="0"/>
-          </a:p>
-          <a:p>
-            <a:pPr marL="0" indent="0">
-              <a:buNone/>
-            </a:pPr>
-            <a:r>
-              <a:rPr lang="en-US" sz="2400" dirty="0"/>
-              <a:t>3. ONE-CLICK BOOKING SYSTEM: Reserve sessions instantly with confirmed time slots without double booking</a:t>
-            </a:r>
-          </a:p>
-          <a:p>
-            <a:pPr marL="0" indent="0">
-              <a:buNone/>
-            </a:pPr>
-            <a:endParaRPr lang="en-US" sz="2400" dirty="0"/>
-          </a:p>
-          <a:p>
-            <a:pPr marL="0" indent="0">
-              <a:buNone/>
-            </a:pPr>
-            <a:r>
-              <a:rPr lang="en-US" sz="2400" dirty="0"/>
-              <a:t>4. INTEGRATED MESSAGING: Secure communication within the platform between clients and consultants </a:t>
-            </a:r>
-          </a:p>
-        </p:txBody>
-      </p:sp>
-    </p:spTree>
-    <p:extLst>
-      <p:ext uri="{BB962C8B-B14F-4D97-AF65-F5344CB8AC3E}">
-        <p14:creationId xmlns:p14="http://schemas.microsoft.com/office/powerpoint/2010/main" val="3470173135"/>
-      </p:ext>
-    </p:extLst>
-  </p:cSld>
-  <p:clrMapOvr>
-    <a:masterClrMapping/>
-  </p:clrMapOvr>
-</p:sld>
-</file>
-
-<file path=ppt/slides/slide8.xml><?xml version="1.0" encoding="utf-8"?>
-<p:sld xmlns:a="http://schemas.openxmlformats.org/drawingml/2006/main" xmlns:r="http://schemas.openxmlformats.org/officeDocument/2006/relationships" xmlns:p="http://schemas.openxmlformats.org/presentationml/2006/main">
-  <p:cSld>
-    <p:spTree>
-      <p:nvGrpSpPr>
         <p:cNvPr id="1" name=""/>
         <p:cNvGrpSpPr/>
         <p:nvPr/>
@@ -5704,10 +5930,9 @@
               <a:t>etc</a:t>
             </a:r>
             <a:r>
-              <a:rPr lang="en-US"/>
+              <a:rPr lang="en-US" dirty="0"/>
               <a:t>).</a:t>
             </a:r>
-            <a:endParaRPr lang="en-US" dirty="0"/>
           </a:p>
         </p:txBody>
       </p:sp>

</xml_diff>